<commit_message>
Added new bibliographies and added more informations in presentations.
</commit_message>
<xml_diff>
--- a/Apresentação/Iniciação científica em análise de vibrações em vigas.pptx
+++ b/Apresentação/Iniciação científica em análise de vibrações em vigas.pptx
@@ -7,10 +7,15 @@
   <p:sldIdLst>
     <p:sldId id="256" r:id="rId2"/>
     <p:sldId id="257" r:id="rId3"/>
-    <p:sldId id="258" r:id="rId4"/>
-    <p:sldId id="259" r:id="rId5"/>
-    <p:sldId id="260" r:id="rId6"/>
-    <p:sldId id="261" r:id="rId7"/>
+    <p:sldId id="264" r:id="rId4"/>
+    <p:sldId id="265" r:id="rId5"/>
+    <p:sldId id="258" r:id="rId6"/>
+    <p:sldId id="259" r:id="rId7"/>
+    <p:sldId id="260" r:id="rId8"/>
+    <p:sldId id="261" r:id="rId9"/>
+    <p:sldId id="262" r:id="rId10"/>
+    <p:sldId id="266" r:id="rId11"/>
+    <p:sldId id="267" r:id="rId12"/>
   </p:sldIdLst>
   <p:sldSz cx="12192000" cy="6858000"/>
   <p:notesSz cx="6858000" cy="9144000"/>
@@ -109,6 +114,11 @@
       </a:defRPr>
     </a:lvl9pPr>
   </p:defaultTextStyle>
+  <p:extLst>
+    <p:ext uri="{EFAFB233-063F-42B5-8137-9DF3F51BA10A}">
+      <p15:sldGuideLst xmlns:p15="http://schemas.microsoft.com/office/powerpoint/2012/main"/>
+    </p:ext>
+  </p:extLst>
 </p:presentation>
 </file>
 
@@ -386,7 +396,7 @@
           <a:p>
             <a:fld id="{E18B6A5A-2E08-4774-B96D-AA2EFCEC5CD8}" type="datetimeFigureOut">
               <a:rPr lang="pt-BR" smtClean="0"/>
-              <a:t>01/03/2020</a:t>
+              <a:t>03/03/2020</a:t>
             </a:fld>
             <a:endParaRPr lang="pt-BR"/>
           </a:p>
@@ -800,7 +810,7 @@
           <a:p>
             <a:fld id="{E18B6A5A-2E08-4774-B96D-AA2EFCEC5CD8}" type="datetimeFigureOut">
               <a:rPr lang="pt-BR" smtClean="0"/>
-              <a:t>01/03/2020</a:t>
+              <a:t>03/03/2020</a:t>
             </a:fld>
             <a:endParaRPr lang="pt-BR"/>
           </a:p>
@@ -1136,7 +1146,7 @@
           <a:p>
             <a:fld id="{E18B6A5A-2E08-4774-B96D-AA2EFCEC5CD8}" type="datetimeFigureOut">
               <a:rPr lang="pt-BR" smtClean="0"/>
-              <a:t>01/03/2020</a:t>
+              <a:t>03/03/2020</a:t>
             </a:fld>
             <a:endParaRPr lang="pt-BR"/>
           </a:p>
@@ -1541,7 +1551,7 @@
           <a:p>
             <a:fld id="{E18B6A5A-2E08-4774-B96D-AA2EFCEC5CD8}" type="datetimeFigureOut">
               <a:rPr lang="pt-BR" smtClean="0"/>
-              <a:t>01/03/2020</a:t>
+              <a:t>03/03/2020</a:t>
             </a:fld>
             <a:endParaRPr lang="pt-BR"/>
           </a:p>
@@ -2109,7 +2119,7 @@
           <a:p>
             <a:fld id="{E18B6A5A-2E08-4774-B96D-AA2EFCEC5CD8}" type="datetimeFigureOut">
               <a:rPr lang="pt-BR" smtClean="0"/>
-              <a:t>01/03/2020</a:t>
+              <a:t>03/03/2020</a:t>
             </a:fld>
             <a:endParaRPr lang="pt-BR"/>
           </a:p>
@@ -2790,7 +2800,7 @@
           <a:p>
             <a:fld id="{E18B6A5A-2E08-4774-B96D-AA2EFCEC5CD8}" type="datetimeFigureOut">
               <a:rPr lang="pt-BR" smtClean="0"/>
-              <a:t>01/03/2020</a:t>
+              <a:t>03/03/2020</a:t>
             </a:fld>
             <a:endParaRPr lang="pt-BR"/>
           </a:p>
@@ -3703,7 +3713,7 @@
           <a:p>
             <a:fld id="{E18B6A5A-2E08-4774-B96D-AA2EFCEC5CD8}" type="datetimeFigureOut">
               <a:rPr lang="pt-BR" smtClean="0"/>
-              <a:t>01/03/2020</a:t>
+              <a:t>03/03/2020</a:t>
             </a:fld>
             <a:endParaRPr lang="pt-BR"/>
           </a:p>
@@ -4016,7 +4026,7 @@
           <a:p>
             <a:fld id="{E18B6A5A-2E08-4774-B96D-AA2EFCEC5CD8}" type="datetimeFigureOut">
               <a:rPr lang="pt-BR" smtClean="0"/>
-              <a:t>01/03/2020</a:t>
+              <a:t>03/03/2020</a:t>
             </a:fld>
             <a:endParaRPr lang="pt-BR"/>
           </a:p>
@@ -4280,7 +4290,7 @@
           <a:p>
             <a:fld id="{E18B6A5A-2E08-4774-B96D-AA2EFCEC5CD8}" type="datetimeFigureOut">
               <a:rPr lang="pt-BR" smtClean="0"/>
-              <a:t>01/03/2020</a:t>
+              <a:t>03/03/2020</a:t>
             </a:fld>
             <a:endParaRPr lang="pt-BR"/>
           </a:p>
@@ -4603,7 +4613,7 @@
           <a:p>
             <a:fld id="{E18B6A5A-2E08-4774-B96D-AA2EFCEC5CD8}" type="datetimeFigureOut">
               <a:rPr lang="pt-BR" smtClean="0"/>
-              <a:t>01/03/2020</a:t>
+              <a:t>03/03/2020</a:t>
             </a:fld>
             <a:endParaRPr lang="pt-BR"/>
           </a:p>
@@ -4992,7 +5002,7 @@
           <a:p>
             <a:fld id="{E18B6A5A-2E08-4774-B96D-AA2EFCEC5CD8}" type="datetimeFigureOut">
               <a:rPr lang="pt-BR" smtClean="0"/>
-              <a:t>01/03/2020</a:t>
+              <a:t>03/03/2020</a:t>
             </a:fld>
             <a:endParaRPr lang="pt-BR"/>
           </a:p>
@@ -5368,7 +5378,7 @@
           <a:p>
             <a:fld id="{E18B6A5A-2E08-4774-B96D-AA2EFCEC5CD8}" type="datetimeFigureOut">
               <a:rPr lang="pt-BR" smtClean="0"/>
-              <a:t>01/03/2020</a:t>
+              <a:t>03/03/2020</a:t>
             </a:fld>
             <a:endParaRPr lang="pt-BR"/>
           </a:p>
@@ -5874,7 +5884,7 @@
           <a:p>
             <a:fld id="{E18B6A5A-2E08-4774-B96D-AA2EFCEC5CD8}" type="datetimeFigureOut">
               <a:rPr lang="pt-BR" smtClean="0"/>
-              <a:t>01/03/2020</a:t>
+              <a:t>03/03/2020</a:t>
             </a:fld>
             <a:endParaRPr lang="pt-BR"/>
           </a:p>
@@ -6131,7 +6141,7 @@
           <a:p>
             <a:fld id="{E18B6A5A-2E08-4774-B96D-AA2EFCEC5CD8}" type="datetimeFigureOut">
               <a:rPr lang="pt-BR" smtClean="0"/>
-              <a:t>01/03/2020</a:t>
+              <a:t>03/03/2020</a:t>
             </a:fld>
             <a:endParaRPr lang="pt-BR"/>
           </a:p>
@@ -6294,7 +6304,7 @@
           <a:p>
             <a:fld id="{E18B6A5A-2E08-4774-B96D-AA2EFCEC5CD8}" type="datetimeFigureOut">
               <a:rPr lang="pt-BR" smtClean="0"/>
-              <a:t>01/03/2020</a:t>
+              <a:t>03/03/2020</a:t>
             </a:fld>
             <a:endParaRPr lang="pt-BR"/>
           </a:p>
@@ -6684,7 +6694,7 @@
           <a:p>
             <a:fld id="{E18B6A5A-2E08-4774-B96D-AA2EFCEC5CD8}" type="datetimeFigureOut">
               <a:rPr lang="pt-BR" smtClean="0"/>
-              <a:t>01/03/2020</a:t>
+              <a:t>03/03/2020</a:t>
             </a:fld>
             <a:endParaRPr lang="pt-BR"/>
           </a:p>
@@ -7093,7 +7103,7 @@
           <a:p>
             <a:fld id="{E18B6A5A-2E08-4774-B96D-AA2EFCEC5CD8}" type="datetimeFigureOut">
               <a:rPr lang="pt-BR" smtClean="0"/>
-              <a:t>01/03/2020</a:t>
+              <a:t>03/03/2020</a:t>
             </a:fld>
             <a:endParaRPr lang="pt-BR"/>
           </a:p>
@@ -7337,7 +7347,7 @@
           <a:p>
             <a:fld id="{E18B6A5A-2E08-4774-B96D-AA2EFCEC5CD8}" type="datetimeFigureOut">
               <a:rPr lang="pt-BR" smtClean="0"/>
-              <a:t>01/03/2020</a:t>
+              <a:t>03/03/2020</a:t>
             </a:fld>
             <a:endParaRPr lang="pt-BR"/>
           </a:p>
@@ -7828,6 +7838,209 @@
 </p:sld>
 </file>
 
+<file path=ppt/slides/slide10.xml><?xml version="1.0" encoding="utf-8"?>
+<p:sld xmlns:a="http://schemas.openxmlformats.org/drawingml/2006/main" xmlns:r="http://schemas.openxmlformats.org/officeDocument/2006/relationships" xmlns:p="http://schemas.openxmlformats.org/presentationml/2006/main">
+  <p:cSld>
+    <p:spTree>
+      <p:nvGrpSpPr>
+        <p:cNvPr id="1" name=""/>
+        <p:cNvGrpSpPr/>
+        <p:nvPr/>
+      </p:nvGrpSpPr>
+      <p:grpSpPr>
+        <a:xfrm>
+          <a:off x="0" y="0"/>
+          <a:ext cx="0" cy="0"/>
+          <a:chOff x="0" y="0"/>
+          <a:chExt cx="0" cy="0"/>
+        </a:xfrm>
+      </p:grpSpPr>
+      <p:sp>
+        <p:nvSpPr>
+          <p:cNvPr id="2" name="Título 1">
+            <a:extLst>
+              <a:ext uri="{FF2B5EF4-FFF2-40B4-BE49-F238E27FC236}">
+                <a16:creationId xmlns:a16="http://schemas.microsoft.com/office/drawing/2014/main" id="{3F61DDF5-7571-4848-BEE1-7278034BBCDE}"/>
+              </a:ext>
+            </a:extLst>
+          </p:cNvPr>
+          <p:cNvSpPr>
+            <a:spLocks noGrp="1"/>
+          </p:cNvSpPr>
+          <p:nvPr>
+            <p:ph type="title"/>
+          </p:nvPr>
+        </p:nvSpPr>
+        <p:spPr/>
+        <p:txBody>
+          <a:bodyPr/>
+          <a:lstStyle/>
+          <a:p>
+            <a:r>
+              <a:rPr lang="pt-BR" dirty="0"/>
+              <a:t>Análise – viga com ADV</a:t>
+            </a:r>
+          </a:p>
+        </p:txBody>
+      </p:sp>
+      <p:sp>
+        <p:nvSpPr>
+          <p:cNvPr id="3" name="Espaço Reservado para Conteúdo 2">
+            <a:extLst>
+              <a:ext uri="{FF2B5EF4-FFF2-40B4-BE49-F238E27FC236}">
+                <a16:creationId xmlns:a16="http://schemas.microsoft.com/office/drawing/2014/main" id="{9E970BF2-BD64-4EBA-9966-436C92DF3990}"/>
+              </a:ext>
+            </a:extLst>
+          </p:cNvPr>
+          <p:cNvSpPr>
+            <a:spLocks noGrp="1"/>
+          </p:cNvSpPr>
+          <p:nvPr>
+            <p:ph idx="1"/>
+          </p:nvPr>
+        </p:nvSpPr>
+        <p:spPr/>
+        <p:txBody>
+          <a:bodyPr/>
+          <a:lstStyle/>
+          <a:p>
+            <a:endParaRPr lang="pt-BR"/>
+          </a:p>
+        </p:txBody>
+      </p:sp>
+    </p:spTree>
+    <p:extLst>
+      <p:ext uri="{BB962C8B-B14F-4D97-AF65-F5344CB8AC3E}">
+        <p14:creationId xmlns:p14="http://schemas.microsoft.com/office/powerpoint/2010/main" val="1012546923"/>
+      </p:ext>
+    </p:extLst>
+  </p:cSld>
+  <p:clrMapOvr>
+    <a:masterClrMapping/>
+  </p:clrMapOvr>
+</p:sld>
+</file>
+
+<file path=ppt/slides/slide11.xml><?xml version="1.0" encoding="utf-8"?>
+<p:sld xmlns:a="http://schemas.openxmlformats.org/drawingml/2006/main" xmlns:r="http://schemas.openxmlformats.org/officeDocument/2006/relationships" xmlns:p="http://schemas.openxmlformats.org/presentationml/2006/main">
+  <p:cSld>
+    <p:spTree>
+      <p:nvGrpSpPr>
+        <p:cNvPr id="1" name=""/>
+        <p:cNvGrpSpPr/>
+        <p:nvPr/>
+      </p:nvGrpSpPr>
+      <p:grpSpPr>
+        <a:xfrm>
+          <a:off x="0" y="0"/>
+          <a:ext cx="0" cy="0"/>
+          <a:chOff x="0" y="0"/>
+          <a:chExt cx="0" cy="0"/>
+        </a:xfrm>
+      </p:grpSpPr>
+      <p:sp>
+        <p:nvSpPr>
+          <p:cNvPr id="2" name="Título 1">
+            <a:extLst>
+              <a:ext uri="{FF2B5EF4-FFF2-40B4-BE49-F238E27FC236}">
+                <a16:creationId xmlns:a16="http://schemas.microsoft.com/office/drawing/2014/main" id="{9436D849-27E7-49C6-BD47-E0C268BACE91}"/>
+              </a:ext>
+            </a:extLst>
+          </p:cNvPr>
+          <p:cNvSpPr>
+            <a:spLocks noGrp="1"/>
+          </p:cNvSpPr>
+          <p:nvPr>
+            <p:ph type="title"/>
+          </p:nvPr>
+        </p:nvSpPr>
+        <p:spPr/>
+        <p:txBody>
+          <a:bodyPr/>
+          <a:lstStyle/>
+          <a:p>
+            <a:r>
+              <a:rPr lang="pt-BR" dirty="0"/>
+              <a:t>Estudo de caso – Equipe </a:t>
+            </a:r>
+            <a:r>
+              <a:rPr lang="pt-BR" dirty="0" err="1"/>
+              <a:t>Mud</a:t>
+            </a:r>
+            <a:r>
+              <a:rPr lang="pt-BR" dirty="0"/>
+              <a:t> </a:t>
+            </a:r>
+            <a:r>
+              <a:rPr lang="pt-BR" dirty="0" err="1"/>
+              <a:t>Runner</a:t>
+            </a:r>
+            <a:r>
+              <a:rPr lang="pt-BR" dirty="0"/>
+              <a:t> Baja SAE</a:t>
+            </a:r>
+          </a:p>
+        </p:txBody>
+      </p:sp>
+      <p:sp>
+        <p:nvSpPr>
+          <p:cNvPr id="3" name="Espaço Reservado para Conteúdo 2">
+            <a:extLst>
+              <a:ext uri="{FF2B5EF4-FFF2-40B4-BE49-F238E27FC236}">
+                <a16:creationId xmlns:a16="http://schemas.microsoft.com/office/drawing/2014/main" id="{893759FB-837D-4DA3-98DA-3FEA8D319AC5}"/>
+              </a:ext>
+            </a:extLst>
+          </p:cNvPr>
+          <p:cNvSpPr>
+            <a:spLocks noGrp="1"/>
+          </p:cNvSpPr>
+          <p:nvPr>
+            <p:ph idx="1"/>
+          </p:nvPr>
+        </p:nvSpPr>
+        <p:spPr/>
+        <p:txBody>
+          <a:bodyPr/>
+          <a:lstStyle/>
+          <a:p>
+            <a:r>
+              <a:rPr lang="pt-BR" dirty="0"/>
+              <a:t>Mostrar a evolução da pesquisa e os resultados no projeto.</a:t>
+            </a:r>
+          </a:p>
+          <a:p>
+            <a:r>
+              <a:rPr lang="pt-BR" dirty="0"/>
+              <a:t>Teste experimental</a:t>
+            </a:r>
+          </a:p>
+          <a:p>
+            <a:pPr lvl="1"/>
+            <a:r>
+              <a:rPr lang="pt-BR" dirty="0"/>
+              <a:t>Sensor MPU 9250 </a:t>
+            </a:r>
+            <a:r>
+              <a:rPr lang="pt-BR"/>
+              <a:t>(acelerômetro).</a:t>
+            </a:r>
+            <a:endParaRPr lang="pt-BR" dirty="0"/>
+          </a:p>
+        </p:txBody>
+      </p:sp>
+    </p:spTree>
+    <p:extLst>
+      <p:ext uri="{BB962C8B-B14F-4D97-AF65-F5344CB8AC3E}">
+        <p14:creationId xmlns:p14="http://schemas.microsoft.com/office/powerpoint/2010/main" val="611603609"/>
+      </p:ext>
+    </p:extLst>
+  </p:cSld>
+  <p:clrMapOvr>
+    <a:masterClrMapping/>
+  </p:clrMapOvr>
+</p:sld>
+</file>
+
 <file path=ppt/slides/slide2.xml><?xml version="1.0" encoding="utf-8"?>
 <p:sld xmlns:a="http://schemas.openxmlformats.org/drawingml/2006/main" xmlns:r="http://schemas.openxmlformats.org/officeDocument/2006/relationships" xmlns:p="http://schemas.openxmlformats.org/presentationml/2006/main">
   <p:cSld>
@@ -7889,9 +8102,16 @@
             <p:ph idx="1"/>
           </p:nvPr>
         </p:nvSpPr>
-        <p:spPr/>
-        <p:txBody>
-          <a:bodyPr/>
+        <p:spPr>
+          <a:xfrm>
+            <a:off x="680321" y="2336873"/>
+            <a:ext cx="9613861" cy="4028416"/>
+          </a:xfrm>
+        </p:spPr>
+        <p:txBody>
+          <a:bodyPr>
+            <a:normAutofit lnSpcReduction="10000"/>
+          </a:bodyPr>
           <a:lstStyle/>
           <a:p>
             <a:r>
@@ -7932,6 +8152,34 @@
             <a:r>
               <a:rPr lang="pt-BR" dirty="0"/>
               <a:t>Utilizar os conceitos de elementos finitos para efetuar as análises em 2D.</a:t>
+            </a:r>
+          </a:p>
+          <a:p>
+            <a:r>
+              <a:rPr lang="pt-BR" dirty="0"/>
+              <a:t>Métodos numéricos utilizados:</a:t>
+            </a:r>
+          </a:p>
+          <a:p>
+            <a:pPr lvl="1"/>
+            <a:r>
+              <a:rPr lang="pt-BR" dirty="0" err="1"/>
+              <a:t>Runge-Kutta</a:t>
+            </a:r>
+            <a:r>
+              <a:rPr lang="pt-BR" dirty="0"/>
+              <a:t> de 4ª ordem</a:t>
+            </a:r>
+          </a:p>
+          <a:p>
+            <a:pPr lvl="1"/>
+            <a:r>
+              <a:rPr lang="pt-BR" dirty="0" err="1"/>
+              <a:t>Newmark</a:t>
+            </a:r>
+            <a:r>
+              <a:rPr lang="pt-BR" dirty="0"/>
+              <a:t>-β</a:t>
             </a:r>
           </a:p>
           <a:p>
@@ -7991,7 +8239,7 @@
           <p:cNvPr id="2" name="Título 1">
             <a:extLst>
               <a:ext uri="{FF2B5EF4-FFF2-40B4-BE49-F238E27FC236}">
-                <a16:creationId xmlns:a16="http://schemas.microsoft.com/office/drawing/2014/main" id="{B00B0E6E-BC7E-4E54-BF83-4E98BE30DB06}"/>
+                <a16:creationId xmlns:a16="http://schemas.microsoft.com/office/drawing/2014/main" id="{D61F3324-F235-4EE9-A40B-65B25525DA21}"/>
               </a:ext>
             </a:extLst>
           </p:cNvPr>
@@ -8009,7 +8257,7 @@
           <a:p>
             <a:r>
               <a:rPr lang="pt-BR" dirty="0"/>
-              <a:t>Evolução da pesquisa</a:t>
+              <a:t>Métodos numéricos utilizados</a:t>
             </a:r>
           </a:p>
         </p:txBody>
@@ -8019,7 +8267,7 @@
           <p:cNvPr id="3" name="Espaço Reservado para Conteúdo 2">
             <a:extLst>
               <a:ext uri="{FF2B5EF4-FFF2-40B4-BE49-F238E27FC236}">
-                <a16:creationId xmlns:a16="http://schemas.microsoft.com/office/drawing/2014/main" id="{257B985C-511D-4ED7-BEA8-354A8DCFF3B6}"/>
+                <a16:creationId xmlns:a16="http://schemas.microsoft.com/office/drawing/2014/main" id="{CDD5DAD6-64FD-48CD-BE0E-43D782043D8F}"/>
               </a:ext>
             </a:extLst>
           </p:cNvPr>
@@ -8030,225 +8278,30 @@
             <p:ph idx="1"/>
           </p:nvPr>
         </p:nvSpPr>
-        <p:spPr/>
+        <p:spPr>
+          <a:xfrm>
+            <a:off x="680322" y="2345750"/>
+            <a:ext cx="5058006" cy="3599316"/>
+          </a:xfrm>
+        </p:spPr>
         <p:txBody>
           <a:bodyPr/>
           <a:lstStyle/>
           <a:p>
             <a:r>
-              <a:rPr lang="pt-BR" dirty="0"/>
-              <a:t>Utilizando C:</a:t>
-            </a:r>
-          </a:p>
-          <a:p>
-            <a:pPr lvl="1"/>
-            <a:r>
-              <a:rPr lang="pt-BR" dirty="0"/>
-              <a:t>Massa pontual com absorvedor dinâmico de vibrações;</a:t>
-            </a:r>
-          </a:p>
-          <a:p>
-            <a:pPr lvl="1"/>
-            <a:r>
-              <a:rPr lang="pt-BR" dirty="0"/>
-              <a:t>Viga simples;</a:t>
-            </a:r>
-          </a:p>
-          <a:p>
-            <a:pPr lvl="1"/>
-            <a:r>
-              <a:rPr lang="pt-BR" dirty="0"/>
-              <a:t>Viga com absorvedor dinâmico de vibrações;</a:t>
-            </a:r>
-          </a:p>
-          <a:p>
-            <a:pPr lvl="1"/>
-            <a:r>
-              <a:rPr lang="pt-BR" dirty="0"/>
-              <a:t>Viga com piezoelétrico.</a:t>
-            </a:r>
-          </a:p>
-          <a:p>
-            <a:r>
-              <a:rPr lang="pt-BR" dirty="0"/>
-              <a:t>Utilizando C#</a:t>
-            </a:r>
-          </a:p>
-          <a:p>
-            <a:pPr lvl="1"/>
-            <a:r>
-              <a:rPr lang="pt-BR" dirty="0"/>
-              <a:t>Otimização das análises:</a:t>
-            </a:r>
-          </a:p>
-          <a:p>
-            <a:pPr lvl="2"/>
-            <a:r>
-              <a:rPr lang="pt-BR" dirty="0"/>
-              <a:t>Tempo;</a:t>
-            </a:r>
-          </a:p>
-          <a:p>
-            <a:pPr lvl="2"/>
-            <a:r>
-              <a:rPr lang="pt-BR" dirty="0"/>
-              <a:t>Quantidade de nós;</a:t>
-            </a:r>
-          </a:p>
-          <a:p>
-            <a:pPr lvl="2"/>
-            <a:r>
-              <a:rPr lang="pt-BR" dirty="0"/>
-              <a:t>Tipos de vigas.</a:t>
-            </a:r>
-          </a:p>
-        </p:txBody>
-      </p:sp>
-    </p:spTree>
-    <p:extLst>
-      <p:ext uri="{BB962C8B-B14F-4D97-AF65-F5344CB8AC3E}">
-        <p14:creationId xmlns:p14="http://schemas.microsoft.com/office/powerpoint/2010/main" val="612273063"/>
-      </p:ext>
-    </p:extLst>
-  </p:cSld>
-  <p:clrMapOvr>
-    <a:masterClrMapping/>
-  </p:clrMapOvr>
-</p:sld>
-</file>
-
-<file path=ppt/slides/slide4.xml><?xml version="1.0" encoding="utf-8"?>
-<p:sld xmlns:a="http://schemas.openxmlformats.org/drawingml/2006/main" xmlns:r="http://schemas.openxmlformats.org/officeDocument/2006/relationships" xmlns:p="http://schemas.openxmlformats.org/presentationml/2006/main">
-  <p:cSld>
-    <p:spTree>
-      <p:nvGrpSpPr>
-        <p:cNvPr id="1" name=""/>
-        <p:cNvGrpSpPr/>
-        <p:nvPr/>
-      </p:nvGrpSpPr>
-      <p:grpSpPr>
-        <a:xfrm>
-          <a:off x="0" y="0"/>
-          <a:ext cx="0" cy="0"/>
-          <a:chOff x="0" y="0"/>
-          <a:chExt cx="0" cy="0"/>
-        </a:xfrm>
-      </p:grpSpPr>
-      <p:sp>
-        <p:nvSpPr>
-          <p:cNvPr id="2" name="Título 1">
+              <a:rPr lang="pt-BR" dirty="0" err="1"/>
+              <a:t>Runge-Kutta</a:t>
+            </a:r>
+            <a:endParaRPr lang="pt-BR" dirty="0"/>
+          </a:p>
+        </p:txBody>
+      </p:sp>
+      <p:sp>
+        <p:nvSpPr>
+          <p:cNvPr id="5" name="Espaço Reservado para Conteúdo 2">
             <a:extLst>
               <a:ext uri="{FF2B5EF4-FFF2-40B4-BE49-F238E27FC236}">
-                <a16:creationId xmlns:a16="http://schemas.microsoft.com/office/drawing/2014/main" id="{9BA1C408-76CC-4364-BF38-801F607A88CD}"/>
-              </a:ext>
-            </a:extLst>
-          </p:cNvPr>
-          <p:cNvSpPr>
-            <a:spLocks noGrp="1"/>
-          </p:cNvSpPr>
-          <p:nvPr>
-            <p:ph type="title"/>
-          </p:nvPr>
-        </p:nvSpPr>
-        <p:spPr/>
-        <p:txBody>
-          <a:bodyPr/>
-          <a:lstStyle/>
-          <a:p>
-            <a:r>
-              <a:rPr lang="pt-BR" dirty="0"/>
-              <a:t>Análise – massa pontual com ADV</a:t>
-            </a:r>
-          </a:p>
-        </p:txBody>
-      </p:sp>
-      <p:sp>
-        <p:nvSpPr>
-          <p:cNvPr id="3" name="Espaço Reservado para Conteúdo 2">
-            <a:extLst>
-              <a:ext uri="{FF2B5EF4-FFF2-40B4-BE49-F238E27FC236}">
-                <a16:creationId xmlns:a16="http://schemas.microsoft.com/office/drawing/2014/main" id="{DD64774C-A981-4678-80C7-D8E8844E95B4}"/>
-              </a:ext>
-            </a:extLst>
-          </p:cNvPr>
-          <p:cNvSpPr>
-            <a:spLocks noGrp="1"/>
-          </p:cNvSpPr>
-          <p:nvPr>
-            <p:ph idx="1"/>
-          </p:nvPr>
-        </p:nvSpPr>
-        <p:spPr>
-          <a:xfrm>
-            <a:off x="680322" y="2336873"/>
-            <a:ext cx="5415678" cy="3599316"/>
-          </a:xfrm>
-        </p:spPr>
-        <p:txBody>
-          <a:bodyPr/>
-          <a:lstStyle/>
-          <a:p>
-            <a:r>
-              <a:rPr lang="pt-BR" dirty="0"/>
-              <a:t>Objetivo:</a:t>
-            </a:r>
-          </a:p>
-          <a:p>
-            <a:pPr lvl="1"/>
-            <a:r>
-              <a:rPr lang="pt-BR" dirty="0"/>
-              <a:t>Iniciar o estudo sobre vibrações e análises numéricas.</a:t>
-            </a:r>
-          </a:p>
-          <a:p>
-            <a:r>
-              <a:rPr lang="pt-BR" dirty="0"/>
-              <a:t>Problemática:</a:t>
-            </a:r>
-          </a:p>
-        </p:txBody>
-      </p:sp>
-      <p:pic>
-        <p:nvPicPr>
-          <p:cNvPr id="5" name="Imagem 4">
-            <a:extLst>
-              <a:ext uri="{FF2B5EF4-FFF2-40B4-BE49-F238E27FC236}">
-                <a16:creationId xmlns:a16="http://schemas.microsoft.com/office/drawing/2014/main" id="{9A6F8B7A-718B-46BD-9894-51ADB6EA8FE3}"/>
-              </a:ext>
-            </a:extLst>
-          </p:cNvPr>
-          <p:cNvPicPr>
-            <a:picLocks noChangeAspect="1"/>
-          </p:cNvPicPr>
-          <p:nvPr/>
-        </p:nvPicPr>
-        <p:blipFill>
-          <a:blip r:embed="rId2"/>
-          <a:stretch>
-            <a:fillRect/>
-          </a:stretch>
-        </p:blipFill>
-        <p:spPr>
-          <a:xfrm>
-            <a:off x="1145139" y="3860479"/>
-            <a:ext cx="2004234" cy="2339543"/>
-          </a:xfrm>
-          <a:prstGeom prst="rect">
-            <a:avLst/>
-          </a:prstGeom>
-          <a:ln w="28575">
-            <a:solidFill>
-              <a:schemeClr val="bg1"/>
-            </a:solidFill>
-          </a:ln>
-        </p:spPr>
-      </p:pic>
-      <p:sp>
-        <p:nvSpPr>
-          <p:cNvPr id="9" name="Espaço Reservado para Conteúdo 2">
-            <a:extLst>
-              <a:ext uri="{FF2B5EF4-FFF2-40B4-BE49-F238E27FC236}">
-                <a16:creationId xmlns:a16="http://schemas.microsoft.com/office/drawing/2014/main" id="{FD21E1BA-DA60-4009-91E6-E7B9732FD300}"/>
+                <a16:creationId xmlns:a16="http://schemas.microsoft.com/office/drawing/2014/main" id="{A8089827-E29E-4891-8BBB-0B763B70760E}"/>
               </a:ext>
             </a:extLst>
           </p:cNvPr>
@@ -8259,8 +8312,8 @@
         </p:nvSpPr>
         <p:spPr>
           <a:xfrm>
-            <a:off x="5487251" y="2336873"/>
-            <a:ext cx="5415678" cy="3599316"/>
+            <a:off x="5738329" y="2345750"/>
+            <a:ext cx="5234471" cy="3599316"/>
           </a:xfrm>
           <a:prstGeom prst="rect">
             <a:avLst/>
@@ -8436,174 +8489,336 @@
           </a:lstStyle>
           <a:p>
             <a:r>
+              <a:rPr lang="pt-BR" dirty="0" err="1"/>
+              <a:t>Newmark</a:t>
+            </a:r>
+            <a:r>
               <a:rPr lang="pt-BR" dirty="0"/>
-              <a:t>DCL:</a:t>
-            </a:r>
-          </a:p>
-          <a:p>
-            <a:endParaRPr lang="pt-BR" dirty="0"/>
-          </a:p>
-          <a:p>
-            <a:endParaRPr lang="pt-BR" dirty="0"/>
-          </a:p>
-          <a:p>
-            <a:pPr marL="0" indent="0">
-              <a:buNone/>
-            </a:pPr>
-            <a:endParaRPr lang="pt-BR" dirty="0"/>
-          </a:p>
-          <a:p>
-            <a:r>
-              <a:rPr lang="pt-BR" dirty="0"/>
-              <a:t>Equações:</a:t>
-            </a:r>
-          </a:p>
-        </p:txBody>
-      </p:sp>
-      <p:pic>
-        <p:nvPicPr>
-          <p:cNvPr id="11" name="Imagem 10">
+              <a:t>-β</a:t>
+            </a:r>
+          </a:p>
+        </p:txBody>
+      </p:sp>
+    </p:spTree>
+    <p:extLst>
+      <p:ext uri="{BB962C8B-B14F-4D97-AF65-F5344CB8AC3E}">
+        <p14:creationId xmlns:p14="http://schemas.microsoft.com/office/powerpoint/2010/main" val="2112089228"/>
+      </p:ext>
+    </p:extLst>
+  </p:cSld>
+  <p:clrMapOvr>
+    <a:masterClrMapping/>
+  </p:clrMapOvr>
+</p:sld>
+</file>
+
+<file path=ppt/slides/slide4.xml><?xml version="1.0" encoding="utf-8"?>
+<p:sld xmlns:a="http://schemas.openxmlformats.org/drawingml/2006/main" xmlns:r="http://schemas.openxmlformats.org/officeDocument/2006/relationships" xmlns:p="http://schemas.openxmlformats.org/presentationml/2006/main">
+  <p:cSld>
+    <p:spTree>
+      <p:nvGrpSpPr>
+        <p:cNvPr id="1" name=""/>
+        <p:cNvGrpSpPr/>
+        <p:nvPr/>
+      </p:nvGrpSpPr>
+      <p:grpSpPr>
+        <a:xfrm>
+          <a:off x="0" y="0"/>
+          <a:ext cx="0" cy="0"/>
+          <a:chOff x="0" y="0"/>
+          <a:chExt cx="0" cy="0"/>
+        </a:xfrm>
+      </p:grpSpPr>
+      <p:sp>
+        <p:nvSpPr>
+          <p:cNvPr id="2" name="Título 1">
             <a:extLst>
               <a:ext uri="{FF2B5EF4-FFF2-40B4-BE49-F238E27FC236}">
-                <a16:creationId xmlns:a16="http://schemas.microsoft.com/office/drawing/2014/main" id="{8AEC2A14-EBF5-4669-A576-411E9C0957E0}"/>
+                <a16:creationId xmlns:a16="http://schemas.microsoft.com/office/drawing/2014/main" id="{9AF2B659-B201-4452-950C-8F6DE67AFF38}"/>
               </a:ext>
             </a:extLst>
           </p:cNvPr>
-          <p:cNvPicPr>
-            <a:picLocks noChangeAspect="1"/>
-          </p:cNvPicPr>
+          <p:cNvSpPr>
+            <a:spLocks noGrp="1"/>
+          </p:cNvSpPr>
+          <p:nvPr>
+            <p:ph type="title"/>
+          </p:nvPr>
+        </p:nvSpPr>
+        <p:spPr/>
+        <p:txBody>
+          <a:bodyPr/>
+          <a:lstStyle/>
+          <a:p>
+            <a:r>
+              <a:rPr lang="pt-BR" dirty="0"/>
+              <a:t>Linguagens utilizadas</a:t>
+            </a:r>
+          </a:p>
+        </p:txBody>
+      </p:sp>
+      <p:sp>
+        <p:nvSpPr>
+          <p:cNvPr id="3" name="Espaço Reservado para Conteúdo 2">
+            <a:extLst>
+              <a:ext uri="{FF2B5EF4-FFF2-40B4-BE49-F238E27FC236}">
+                <a16:creationId xmlns:a16="http://schemas.microsoft.com/office/drawing/2014/main" id="{89B026A2-5F50-45B3-B218-8D8F8C4163B5}"/>
+              </a:ext>
+            </a:extLst>
+          </p:cNvPr>
+          <p:cNvSpPr>
+            <a:spLocks noGrp="1"/>
+          </p:cNvSpPr>
+          <p:nvPr>
+            <p:ph idx="1"/>
+          </p:nvPr>
+        </p:nvSpPr>
+        <p:spPr>
+          <a:xfrm>
+            <a:off x="680322" y="2336873"/>
+            <a:ext cx="5058006" cy="3599316"/>
+          </a:xfrm>
+        </p:spPr>
+        <p:txBody>
+          <a:bodyPr/>
+          <a:lstStyle/>
+          <a:p>
+            <a:r>
+              <a:rPr lang="pt-BR" dirty="0"/>
+              <a:t>C</a:t>
+            </a:r>
+          </a:p>
+          <a:p>
+            <a:pPr lvl="1"/>
+            <a:r>
+              <a:rPr lang="pt-BR" dirty="0"/>
+              <a:t>Estrutura sequencial;</a:t>
+            </a:r>
+          </a:p>
+          <a:p>
+            <a:pPr lvl="1"/>
+            <a:endParaRPr lang="pt-BR" dirty="0"/>
+          </a:p>
+          <a:p>
+            <a:pPr lvl="1"/>
+            <a:endParaRPr lang="pt-BR" dirty="0"/>
+          </a:p>
+          <a:p>
+            <a:pPr lvl="1"/>
+            <a:endParaRPr lang="pt-BR" dirty="0"/>
+          </a:p>
+        </p:txBody>
+      </p:sp>
+      <p:sp>
+        <p:nvSpPr>
+          <p:cNvPr id="4" name="Espaço Reservado para Conteúdo 2">
+            <a:extLst>
+              <a:ext uri="{FF2B5EF4-FFF2-40B4-BE49-F238E27FC236}">
+                <a16:creationId xmlns:a16="http://schemas.microsoft.com/office/drawing/2014/main" id="{25D74944-48FC-4109-B367-6ECA6C76249D}"/>
+              </a:ext>
+            </a:extLst>
+          </p:cNvPr>
+          <p:cNvSpPr txBox="1">
+            <a:spLocks/>
+          </p:cNvSpPr>
           <p:nvPr/>
-        </p:nvPicPr>
-        <p:blipFill>
-          <a:blip r:embed="rId3"/>
-          <a:stretch>
-            <a:fillRect/>
-          </a:stretch>
-        </p:blipFill>
-        <p:spPr>
-          <a:xfrm>
-            <a:off x="6111594" y="2780442"/>
-            <a:ext cx="2854960" cy="1297116"/>
+        </p:nvSpPr>
+        <p:spPr>
+          <a:xfrm>
+            <a:off x="5738328" y="2336873"/>
+            <a:ext cx="5058006" cy="3599316"/>
           </a:xfrm>
           <a:prstGeom prst="rect">
             <a:avLst/>
           </a:prstGeom>
-          <a:ln w="28575">
-            <a:solidFill>
-              <a:schemeClr val="bg1"/>
-            </a:solidFill>
-          </a:ln>
-        </p:spPr>
-      </p:pic>
-      <p:pic>
-        <p:nvPicPr>
-          <p:cNvPr id="12" name="Imagem 11">
-            <a:extLst>
-              <a:ext uri="{FF2B5EF4-FFF2-40B4-BE49-F238E27FC236}">
-                <a16:creationId xmlns:a16="http://schemas.microsoft.com/office/drawing/2014/main" id="{548D2099-CDEA-47BA-B47A-C2E68AAAA3D1}"/>
-              </a:ext>
-            </a:extLst>
-          </p:cNvPr>
-          <p:cNvPicPr>
-            <a:picLocks noChangeAspect="1"/>
-          </p:cNvPicPr>
-          <p:nvPr/>
-        </p:nvPicPr>
-        <p:blipFill>
-          <a:blip r:embed="rId4"/>
-          <a:stretch>
-            <a:fillRect/>
-          </a:stretch>
-        </p:blipFill>
-        <p:spPr>
-          <a:xfrm>
-            <a:off x="6049973" y="4683541"/>
-            <a:ext cx="3880515" cy="292082"/>
-          </a:xfrm>
-          <a:prstGeom prst="rect">
-            <a:avLst/>
-          </a:prstGeom>
-          <a:ln w="28575">
-            <a:solidFill>
-              <a:schemeClr val="bg1"/>
-            </a:solidFill>
-          </a:ln>
-        </p:spPr>
-      </p:pic>
-      <p:pic>
-        <p:nvPicPr>
-          <p:cNvPr id="13" name="Imagem 12">
-            <a:extLst>
-              <a:ext uri="{FF2B5EF4-FFF2-40B4-BE49-F238E27FC236}">
-                <a16:creationId xmlns:a16="http://schemas.microsoft.com/office/drawing/2014/main" id="{C40B650A-8068-48C6-813F-4B7893FD7B9F}"/>
-              </a:ext>
-            </a:extLst>
-          </p:cNvPr>
-          <p:cNvPicPr>
-            <a:picLocks noChangeAspect="1"/>
-          </p:cNvPicPr>
-          <p:nvPr/>
-        </p:nvPicPr>
-        <p:blipFill>
-          <a:blip r:embed="rId5"/>
-          <a:stretch>
-            <a:fillRect/>
-          </a:stretch>
-        </p:blipFill>
-        <p:spPr>
-          <a:xfrm>
-            <a:off x="6049973" y="5045764"/>
-            <a:ext cx="2661190" cy="292082"/>
-          </a:xfrm>
-          <a:prstGeom prst="rect">
-            <a:avLst/>
-          </a:prstGeom>
-          <a:ln w="28575">
-            <a:solidFill>
-              <a:schemeClr val="bg1"/>
-            </a:solidFill>
-          </a:ln>
-        </p:spPr>
-      </p:pic>
-      <p:pic>
-        <p:nvPicPr>
-          <p:cNvPr id="14" name="Imagem 13">
-            <a:extLst>
-              <a:ext uri="{FF2B5EF4-FFF2-40B4-BE49-F238E27FC236}">
-                <a16:creationId xmlns:a16="http://schemas.microsoft.com/office/drawing/2014/main" id="{E1638F61-92F0-440D-A027-4BBA4AA340AA}"/>
-              </a:ext>
-            </a:extLst>
-          </p:cNvPr>
-          <p:cNvPicPr>
-            <a:picLocks noChangeAspect="1"/>
-          </p:cNvPicPr>
-          <p:nvPr/>
-        </p:nvPicPr>
-        <p:blipFill>
-          <a:blip r:embed="rId6"/>
-          <a:stretch>
-            <a:fillRect/>
-          </a:stretch>
-        </p:blipFill>
-        <p:spPr>
-          <a:xfrm>
-            <a:off x="6049973" y="5404422"/>
-            <a:ext cx="4404168" cy="461626"/>
-          </a:xfrm>
-          <a:prstGeom prst="rect">
-            <a:avLst/>
-          </a:prstGeom>
-          <a:ln w="28575">
-            <a:solidFill>
-              <a:schemeClr val="bg1"/>
-            </a:solidFill>
-          </a:ln>
-        </p:spPr>
-      </p:pic>
+        </p:spPr>
+        <p:txBody>
+          <a:bodyPr vert="horz" lIns="91440" tIns="45720" rIns="91440" bIns="45720" rtlCol="0">
+            <a:normAutofit/>
+          </a:bodyPr>
+          <a:lstStyle>
+            <a:lvl1pPr marL="228600" indent="-228600" algn="l" defTabSz="914400" rtl="0" eaLnBrk="1" latinLnBrk="0" hangingPunct="1">
+              <a:lnSpc>
+                <a:spcPct val="90000"/>
+              </a:lnSpc>
+              <a:spcBef>
+                <a:spcPts val="1000"/>
+              </a:spcBef>
+              <a:buFont typeface="Arial" panose="020B0604020202020204" pitchFamily="34" charset="0"/>
+              <a:buChar char="•"/>
+              <a:defRPr sz="2400" kern="1200">
+                <a:solidFill>
+                  <a:schemeClr val="tx1"/>
+                </a:solidFill>
+                <a:latin typeface="+mn-lt"/>
+                <a:ea typeface="+mn-ea"/>
+                <a:cs typeface="+mn-cs"/>
+              </a:defRPr>
+            </a:lvl1pPr>
+            <a:lvl2pPr marL="685800" indent="-228600" algn="l" defTabSz="914400" rtl="0" eaLnBrk="1" latinLnBrk="0" hangingPunct="1">
+              <a:lnSpc>
+                <a:spcPct val="90000"/>
+              </a:lnSpc>
+              <a:spcBef>
+                <a:spcPts val="500"/>
+              </a:spcBef>
+              <a:buFont typeface="Arial" panose="020B0604020202020204" pitchFamily="34" charset="0"/>
+              <a:buChar char="•"/>
+              <a:defRPr sz="2000" kern="1200">
+                <a:solidFill>
+                  <a:schemeClr val="tx1"/>
+                </a:solidFill>
+                <a:latin typeface="+mn-lt"/>
+                <a:ea typeface="+mn-ea"/>
+                <a:cs typeface="+mn-cs"/>
+              </a:defRPr>
+            </a:lvl2pPr>
+            <a:lvl3pPr marL="1143000" indent="-228600" algn="l" defTabSz="914400" rtl="0" eaLnBrk="1" latinLnBrk="0" hangingPunct="1">
+              <a:lnSpc>
+                <a:spcPct val="90000"/>
+              </a:lnSpc>
+              <a:spcBef>
+                <a:spcPts val="500"/>
+              </a:spcBef>
+              <a:buFont typeface="Arial" panose="020B0604020202020204" pitchFamily="34" charset="0"/>
+              <a:buChar char="•"/>
+              <a:defRPr sz="1800" kern="1200">
+                <a:solidFill>
+                  <a:schemeClr val="tx1"/>
+                </a:solidFill>
+                <a:latin typeface="+mn-lt"/>
+                <a:ea typeface="+mn-ea"/>
+                <a:cs typeface="+mn-cs"/>
+              </a:defRPr>
+            </a:lvl3pPr>
+            <a:lvl4pPr marL="1600200" indent="-228600" algn="l" defTabSz="914400" rtl="0" eaLnBrk="1" latinLnBrk="0" hangingPunct="1">
+              <a:lnSpc>
+                <a:spcPct val="90000"/>
+              </a:lnSpc>
+              <a:spcBef>
+                <a:spcPts val="500"/>
+              </a:spcBef>
+              <a:buFont typeface="Arial" panose="020B0604020202020204" pitchFamily="34" charset="0"/>
+              <a:buChar char="•"/>
+              <a:defRPr sz="1600" kern="1200">
+                <a:solidFill>
+                  <a:schemeClr val="tx1"/>
+                </a:solidFill>
+                <a:latin typeface="+mn-lt"/>
+                <a:ea typeface="+mn-ea"/>
+                <a:cs typeface="+mn-cs"/>
+              </a:defRPr>
+            </a:lvl4pPr>
+            <a:lvl5pPr marL="2057400" indent="-228600" algn="l" defTabSz="914400" rtl="0" eaLnBrk="1" latinLnBrk="0" hangingPunct="1">
+              <a:lnSpc>
+                <a:spcPct val="90000"/>
+              </a:lnSpc>
+              <a:spcBef>
+                <a:spcPts val="500"/>
+              </a:spcBef>
+              <a:buFont typeface="Arial" panose="020B0604020202020204" pitchFamily="34" charset="0"/>
+              <a:buChar char="•"/>
+              <a:defRPr sz="1600" kern="1200">
+                <a:solidFill>
+                  <a:schemeClr val="tx1"/>
+                </a:solidFill>
+                <a:latin typeface="+mn-lt"/>
+                <a:ea typeface="+mn-ea"/>
+                <a:cs typeface="+mn-cs"/>
+              </a:defRPr>
+            </a:lvl5pPr>
+            <a:lvl6pPr marL="2514600" indent="-228600" algn="l" defTabSz="914400" rtl="0" eaLnBrk="1" latinLnBrk="0" hangingPunct="1">
+              <a:lnSpc>
+                <a:spcPct val="90000"/>
+              </a:lnSpc>
+              <a:spcBef>
+                <a:spcPts val="500"/>
+              </a:spcBef>
+              <a:buFont typeface="Arial" panose="020B0604020202020204" pitchFamily="34" charset="0"/>
+              <a:buChar char="•"/>
+              <a:defRPr sz="1400" kern="1200">
+                <a:solidFill>
+                  <a:schemeClr val="tx1"/>
+                </a:solidFill>
+                <a:latin typeface="+mn-lt"/>
+                <a:ea typeface="+mn-ea"/>
+                <a:cs typeface="+mn-cs"/>
+              </a:defRPr>
+            </a:lvl6pPr>
+            <a:lvl7pPr marL="2971800" indent="-228600" algn="l" defTabSz="914400" rtl="0" eaLnBrk="1" latinLnBrk="0" hangingPunct="1">
+              <a:lnSpc>
+                <a:spcPct val="90000"/>
+              </a:lnSpc>
+              <a:spcBef>
+                <a:spcPts val="500"/>
+              </a:spcBef>
+              <a:buFont typeface="Arial" panose="020B0604020202020204" pitchFamily="34" charset="0"/>
+              <a:buChar char="•"/>
+              <a:defRPr sz="1400" kern="1200">
+                <a:solidFill>
+                  <a:schemeClr val="tx1"/>
+                </a:solidFill>
+                <a:latin typeface="+mn-lt"/>
+                <a:ea typeface="+mn-ea"/>
+                <a:cs typeface="+mn-cs"/>
+              </a:defRPr>
+            </a:lvl7pPr>
+            <a:lvl8pPr marL="3429000" indent="-228600" algn="l" defTabSz="914400" rtl="0" eaLnBrk="1" latinLnBrk="0" hangingPunct="1">
+              <a:lnSpc>
+                <a:spcPct val="90000"/>
+              </a:lnSpc>
+              <a:spcBef>
+                <a:spcPts val="500"/>
+              </a:spcBef>
+              <a:buFont typeface="Arial" panose="020B0604020202020204" pitchFamily="34" charset="0"/>
+              <a:buChar char="•"/>
+              <a:defRPr sz="1400" kern="1200">
+                <a:solidFill>
+                  <a:schemeClr val="tx1"/>
+                </a:solidFill>
+                <a:latin typeface="+mn-lt"/>
+                <a:ea typeface="+mn-ea"/>
+                <a:cs typeface="+mn-cs"/>
+              </a:defRPr>
+            </a:lvl8pPr>
+            <a:lvl9pPr marL="3886200" indent="-228600" algn="l" defTabSz="914400" rtl="0" eaLnBrk="1" latinLnBrk="0" hangingPunct="1">
+              <a:lnSpc>
+                <a:spcPct val="90000"/>
+              </a:lnSpc>
+              <a:spcBef>
+                <a:spcPts val="500"/>
+              </a:spcBef>
+              <a:buFont typeface="Arial" panose="020B0604020202020204" pitchFamily="34" charset="0"/>
+              <a:buChar char="•"/>
+              <a:defRPr sz="1400" kern="1200">
+                <a:solidFill>
+                  <a:schemeClr val="tx1"/>
+                </a:solidFill>
+                <a:latin typeface="+mn-lt"/>
+                <a:ea typeface="+mn-ea"/>
+                <a:cs typeface="+mn-cs"/>
+              </a:defRPr>
+            </a:lvl9pPr>
+          </a:lstStyle>
+          <a:p>
+            <a:r>
+              <a:rPr lang="pt-BR" dirty="0"/>
+              <a:t>C#</a:t>
+            </a:r>
+          </a:p>
+          <a:p>
+            <a:pPr lvl="1"/>
+            <a:r>
+              <a:rPr lang="pt-BR" dirty="0"/>
+              <a:t>Programação orientada a objeto;</a:t>
+            </a:r>
+          </a:p>
+        </p:txBody>
+      </p:sp>
     </p:spTree>
     <p:extLst>
       <p:ext uri="{BB962C8B-B14F-4D97-AF65-F5344CB8AC3E}">
-        <p14:creationId xmlns:p14="http://schemas.microsoft.com/office/powerpoint/2010/main" val="965091218"/>
+        <p14:creationId xmlns:p14="http://schemas.microsoft.com/office/powerpoint/2010/main" val="1173551687"/>
       </p:ext>
     </p:extLst>
   </p:cSld>
@@ -8635,7 +8850,7 @@
           <p:cNvPr id="2" name="Título 1">
             <a:extLst>
               <a:ext uri="{FF2B5EF4-FFF2-40B4-BE49-F238E27FC236}">
-                <a16:creationId xmlns:a16="http://schemas.microsoft.com/office/drawing/2014/main" id="{80C50C88-63E1-467D-B210-3F2F07E52AE3}"/>
+                <a16:creationId xmlns:a16="http://schemas.microsoft.com/office/drawing/2014/main" id="{B00B0E6E-BC7E-4E54-BF83-4E98BE30DB06}"/>
               </a:ext>
             </a:extLst>
           </p:cNvPr>
@@ -8653,7 +8868,7 @@
           <a:p>
             <a:r>
               <a:rPr lang="pt-BR" dirty="0"/>
-              <a:t>Análise – massa pontual com ADV</a:t>
+              <a:t>Evolução da pesquisa</a:t>
             </a:r>
           </a:p>
         </p:txBody>
@@ -8663,7 +8878,7 @@
           <p:cNvPr id="3" name="Espaço Reservado para Conteúdo 2">
             <a:extLst>
               <a:ext uri="{FF2B5EF4-FFF2-40B4-BE49-F238E27FC236}">
-                <a16:creationId xmlns:a16="http://schemas.microsoft.com/office/drawing/2014/main" id="{7961D2B2-EAFC-4007-BFBB-596024A24869}"/>
+                <a16:creationId xmlns:a16="http://schemas.microsoft.com/office/drawing/2014/main" id="{257B985C-511D-4ED7-BEA8-354A8DCFF3B6}"/>
               </a:ext>
             </a:extLst>
           </p:cNvPr>
@@ -8681,62 +8896,77 @@
           <a:p>
             <a:r>
               <a:rPr lang="pt-BR" dirty="0"/>
-              <a:t>Método de integração numérica utilizado:</a:t>
+              <a:t>Utilizando C</a:t>
             </a:r>
           </a:p>
           <a:p>
             <a:pPr lvl="1"/>
             <a:r>
-              <a:rPr lang="pt-BR" dirty="0" err="1"/>
-              <a:t>Runge</a:t>
-            </a:r>
-            <a:r>
               <a:rPr lang="pt-BR" dirty="0"/>
-              <a:t> </a:t>
-            </a:r>
-            <a:r>
-              <a:rPr lang="pt-BR" dirty="0" err="1"/>
-              <a:t>Kutta</a:t>
-            </a:r>
+              <a:t>Massa pontual com absorvedor dinâmico de vibrações;</a:t>
+            </a:r>
+          </a:p>
+          <a:p>
+            <a:pPr lvl="1"/>
             <a:r>
               <a:rPr lang="pt-BR" dirty="0"/>
-              <a:t> de 4ª ordem.</a:t>
+              <a:t>Viga simples;</a:t>
+            </a:r>
+          </a:p>
+          <a:p>
+            <a:pPr lvl="1"/>
+            <a:r>
+              <a:rPr lang="pt-BR" dirty="0"/>
+              <a:t>Viga com absorvedor dinâmico de vibrações;</a:t>
+            </a:r>
+          </a:p>
+          <a:p>
+            <a:pPr lvl="1"/>
+            <a:r>
+              <a:rPr lang="pt-BR" dirty="0"/>
+              <a:t>Viga com piezoelétrico.</a:t>
+            </a:r>
+          </a:p>
+          <a:p>
+            <a:r>
+              <a:rPr lang="pt-BR" dirty="0"/>
+              <a:t>Utilizando C#</a:t>
+            </a:r>
+          </a:p>
+          <a:p>
+            <a:pPr lvl="1"/>
+            <a:r>
+              <a:rPr lang="pt-BR" dirty="0"/>
+              <a:t>Otimização das análises:</a:t>
             </a:r>
           </a:p>
           <a:p>
             <a:pPr lvl="2"/>
             <a:r>
               <a:rPr lang="pt-BR" dirty="0"/>
-              <a:t>Solução de sistema de </a:t>
-            </a:r>
-            <a:r>
-              <a:rPr lang="pt-BR" dirty="0" err="1"/>
-              <a:t>EDOs</a:t>
-            </a:r>
+              <a:t>Tempo;</a:t>
+            </a:r>
+          </a:p>
+          <a:p>
+            <a:pPr lvl="2"/>
             <a:r>
               <a:rPr lang="pt-BR" dirty="0"/>
-              <a:t> com problema de valor inicial.</a:t>
+              <a:t>Quantidade de nós;</a:t>
             </a:r>
           </a:p>
           <a:p>
             <a:pPr lvl="2"/>
-            <a:endParaRPr lang="pt-BR" dirty="0"/>
-          </a:p>
-          <a:p>
             <a:r>
               <a:rPr lang="pt-BR" dirty="0"/>
-              <a:t>EXPLICAR QUE PRECISOU ADAPTAR O RUNGE-KUTTA PARA EDO DE SEGUNDA ORDEM.</a:t>
-            </a:r>
-          </a:p>
-          <a:p>
-            <a:endParaRPr lang="pt-BR" dirty="0"/>
+              <a:t>Tipos de vigas.</a:t>
+            </a:r>
           </a:p>
         </p:txBody>
       </p:sp>
     </p:spTree>
     <p:extLst>
       <p:ext uri="{BB962C8B-B14F-4D97-AF65-F5344CB8AC3E}">
-        <p14:creationId xmlns:p14="http://schemas.microsoft.com/office/powerpoint/2010/main" val="2454361913"/>
+        <p14:creationId xmlns:p14="http://schemas.microsoft.com/office/powerpoint/2010/main" val="612273063"/>
       </p:ext>
     </p:extLst>
   </p:cSld>
@@ -8768,6 +8998,627 @@
           <p:cNvPr id="2" name="Título 1">
             <a:extLst>
               <a:ext uri="{FF2B5EF4-FFF2-40B4-BE49-F238E27FC236}">
+                <a16:creationId xmlns:a16="http://schemas.microsoft.com/office/drawing/2014/main" id="{9BA1C408-76CC-4364-BF38-801F607A88CD}"/>
+              </a:ext>
+            </a:extLst>
+          </p:cNvPr>
+          <p:cNvSpPr>
+            <a:spLocks noGrp="1"/>
+          </p:cNvSpPr>
+          <p:nvPr>
+            <p:ph type="title"/>
+          </p:nvPr>
+        </p:nvSpPr>
+        <p:spPr/>
+        <p:txBody>
+          <a:bodyPr/>
+          <a:lstStyle/>
+          <a:p>
+            <a:r>
+              <a:rPr lang="pt-BR" dirty="0"/>
+              <a:t>Análise – massa pontual com ADV</a:t>
+            </a:r>
+          </a:p>
+        </p:txBody>
+      </p:sp>
+      <p:sp>
+        <p:nvSpPr>
+          <p:cNvPr id="3" name="Espaço Reservado para Conteúdo 2">
+            <a:extLst>
+              <a:ext uri="{FF2B5EF4-FFF2-40B4-BE49-F238E27FC236}">
+                <a16:creationId xmlns:a16="http://schemas.microsoft.com/office/drawing/2014/main" id="{DD64774C-A981-4678-80C7-D8E8844E95B4}"/>
+              </a:ext>
+            </a:extLst>
+          </p:cNvPr>
+          <p:cNvSpPr>
+            <a:spLocks noGrp="1"/>
+          </p:cNvSpPr>
+          <p:nvPr>
+            <p:ph idx="1"/>
+          </p:nvPr>
+        </p:nvSpPr>
+        <p:spPr>
+          <a:xfrm>
+            <a:off x="680322" y="2336873"/>
+            <a:ext cx="5415678" cy="3599316"/>
+          </a:xfrm>
+        </p:spPr>
+        <p:txBody>
+          <a:bodyPr/>
+          <a:lstStyle/>
+          <a:p>
+            <a:r>
+              <a:rPr lang="pt-BR" dirty="0"/>
+              <a:t>Objetivo:</a:t>
+            </a:r>
+          </a:p>
+          <a:p>
+            <a:pPr lvl="1"/>
+            <a:r>
+              <a:rPr lang="pt-BR" dirty="0"/>
+              <a:t>Iniciar o estudo sobre vibrações e análises numéricas.</a:t>
+            </a:r>
+          </a:p>
+          <a:p>
+            <a:r>
+              <a:rPr lang="pt-BR" dirty="0"/>
+              <a:t>Problemática:</a:t>
+            </a:r>
+          </a:p>
+        </p:txBody>
+      </p:sp>
+      <p:pic>
+        <p:nvPicPr>
+          <p:cNvPr id="5" name="Imagem 4">
+            <a:extLst>
+              <a:ext uri="{FF2B5EF4-FFF2-40B4-BE49-F238E27FC236}">
+                <a16:creationId xmlns:a16="http://schemas.microsoft.com/office/drawing/2014/main" id="{9A6F8B7A-718B-46BD-9894-51ADB6EA8FE3}"/>
+              </a:ext>
+            </a:extLst>
+          </p:cNvPr>
+          <p:cNvPicPr>
+            <a:picLocks noChangeAspect="1"/>
+          </p:cNvPicPr>
+          <p:nvPr/>
+        </p:nvPicPr>
+        <p:blipFill>
+          <a:blip r:embed="rId2"/>
+          <a:stretch>
+            <a:fillRect/>
+          </a:stretch>
+        </p:blipFill>
+        <p:spPr>
+          <a:xfrm>
+            <a:off x="1145139" y="3860479"/>
+            <a:ext cx="2004234" cy="2339543"/>
+          </a:xfrm>
+          <a:prstGeom prst="rect">
+            <a:avLst/>
+          </a:prstGeom>
+          <a:ln w="28575">
+            <a:solidFill>
+              <a:schemeClr val="bg1"/>
+            </a:solidFill>
+          </a:ln>
+        </p:spPr>
+      </p:pic>
+      <p:sp>
+        <p:nvSpPr>
+          <p:cNvPr id="9" name="Espaço Reservado para Conteúdo 2">
+            <a:extLst>
+              <a:ext uri="{FF2B5EF4-FFF2-40B4-BE49-F238E27FC236}">
+                <a16:creationId xmlns:a16="http://schemas.microsoft.com/office/drawing/2014/main" id="{FD21E1BA-DA60-4009-91E6-E7B9732FD300}"/>
+              </a:ext>
+            </a:extLst>
+          </p:cNvPr>
+          <p:cNvSpPr txBox="1">
+            <a:spLocks/>
+          </p:cNvSpPr>
+          <p:nvPr/>
+        </p:nvSpPr>
+        <p:spPr>
+          <a:xfrm>
+            <a:off x="5487251" y="2336873"/>
+            <a:ext cx="5415678" cy="3599316"/>
+          </a:xfrm>
+          <a:prstGeom prst="rect">
+            <a:avLst/>
+          </a:prstGeom>
+        </p:spPr>
+        <p:txBody>
+          <a:bodyPr vert="horz" lIns="91440" tIns="45720" rIns="91440" bIns="45720" rtlCol="0">
+            <a:normAutofit/>
+          </a:bodyPr>
+          <a:lstStyle>
+            <a:lvl1pPr marL="228600" indent="-228600" algn="l" defTabSz="914400" rtl="0" eaLnBrk="1" latinLnBrk="0" hangingPunct="1">
+              <a:lnSpc>
+                <a:spcPct val="90000"/>
+              </a:lnSpc>
+              <a:spcBef>
+                <a:spcPts val="1000"/>
+              </a:spcBef>
+              <a:buFont typeface="Arial" panose="020B0604020202020204" pitchFamily="34" charset="0"/>
+              <a:buChar char="•"/>
+              <a:defRPr sz="2400" kern="1200">
+                <a:solidFill>
+                  <a:schemeClr val="tx1"/>
+                </a:solidFill>
+                <a:latin typeface="+mn-lt"/>
+                <a:ea typeface="+mn-ea"/>
+                <a:cs typeface="+mn-cs"/>
+              </a:defRPr>
+            </a:lvl1pPr>
+            <a:lvl2pPr marL="685800" indent="-228600" algn="l" defTabSz="914400" rtl="0" eaLnBrk="1" latinLnBrk="0" hangingPunct="1">
+              <a:lnSpc>
+                <a:spcPct val="90000"/>
+              </a:lnSpc>
+              <a:spcBef>
+                <a:spcPts val="500"/>
+              </a:spcBef>
+              <a:buFont typeface="Arial" panose="020B0604020202020204" pitchFamily="34" charset="0"/>
+              <a:buChar char="•"/>
+              <a:defRPr sz="2000" kern="1200">
+                <a:solidFill>
+                  <a:schemeClr val="tx1"/>
+                </a:solidFill>
+                <a:latin typeface="+mn-lt"/>
+                <a:ea typeface="+mn-ea"/>
+                <a:cs typeface="+mn-cs"/>
+              </a:defRPr>
+            </a:lvl2pPr>
+            <a:lvl3pPr marL="1143000" indent="-228600" algn="l" defTabSz="914400" rtl="0" eaLnBrk="1" latinLnBrk="0" hangingPunct="1">
+              <a:lnSpc>
+                <a:spcPct val="90000"/>
+              </a:lnSpc>
+              <a:spcBef>
+                <a:spcPts val="500"/>
+              </a:spcBef>
+              <a:buFont typeface="Arial" panose="020B0604020202020204" pitchFamily="34" charset="0"/>
+              <a:buChar char="•"/>
+              <a:defRPr sz="1800" kern="1200">
+                <a:solidFill>
+                  <a:schemeClr val="tx1"/>
+                </a:solidFill>
+                <a:latin typeface="+mn-lt"/>
+                <a:ea typeface="+mn-ea"/>
+                <a:cs typeface="+mn-cs"/>
+              </a:defRPr>
+            </a:lvl3pPr>
+            <a:lvl4pPr marL="1600200" indent="-228600" algn="l" defTabSz="914400" rtl="0" eaLnBrk="1" latinLnBrk="0" hangingPunct="1">
+              <a:lnSpc>
+                <a:spcPct val="90000"/>
+              </a:lnSpc>
+              <a:spcBef>
+                <a:spcPts val="500"/>
+              </a:spcBef>
+              <a:buFont typeface="Arial" panose="020B0604020202020204" pitchFamily="34" charset="0"/>
+              <a:buChar char="•"/>
+              <a:defRPr sz="1600" kern="1200">
+                <a:solidFill>
+                  <a:schemeClr val="tx1"/>
+                </a:solidFill>
+                <a:latin typeface="+mn-lt"/>
+                <a:ea typeface="+mn-ea"/>
+                <a:cs typeface="+mn-cs"/>
+              </a:defRPr>
+            </a:lvl4pPr>
+            <a:lvl5pPr marL="2057400" indent="-228600" algn="l" defTabSz="914400" rtl="0" eaLnBrk="1" latinLnBrk="0" hangingPunct="1">
+              <a:lnSpc>
+                <a:spcPct val="90000"/>
+              </a:lnSpc>
+              <a:spcBef>
+                <a:spcPts val="500"/>
+              </a:spcBef>
+              <a:buFont typeface="Arial" panose="020B0604020202020204" pitchFamily="34" charset="0"/>
+              <a:buChar char="•"/>
+              <a:defRPr sz="1600" kern="1200">
+                <a:solidFill>
+                  <a:schemeClr val="tx1"/>
+                </a:solidFill>
+                <a:latin typeface="+mn-lt"/>
+                <a:ea typeface="+mn-ea"/>
+                <a:cs typeface="+mn-cs"/>
+              </a:defRPr>
+            </a:lvl5pPr>
+            <a:lvl6pPr marL="2514600" indent="-228600" algn="l" defTabSz="914400" rtl="0" eaLnBrk="1" latinLnBrk="0" hangingPunct="1">
+              <a:lnSpc>
+                <a:spcPct val="90000"/>
+              </a:lnSpc>
+              <a:spcBef>
+                <a:spcPts val="500"/>
+              </a:spcBef>
+              <a:buFont typeface="Arial" panose="020B0604020202020204" pitchFamily="34" charset="0"/>
+              <a:buChar char="•"/>
+              <a:defRPr sz="1400" kern="1200">
+                <a:solidFill>
+                  <a:schemeClr val="tx1"/>
+                </a:solidFill>
+                <a:latin typeface="+mn-lt"/>
+                <a:ea typeface="+mn-ea"/>
+                <a:cs typeface="+mn-cs"/>
+              </a:defRPr>
+            </a:lvl6pPr>
+            <a:lvl7pPr marL="2971800" indent="-228600" algn="l" defTabSz="914400" rtl="0" eaLnBrk="1" latinLnBrk="0" hangingPunct="1">
+              <a:lnSpc>
+                <a:spcPct val="90000"/>
+              </a:lnSpc>
+              <a:spcBef>
+                <a:spcPts val="500"/>
+              </a:spcBef>
+              <a:buFont typeface="Arial" panose="020B0604020202020204" pitchFamily="34" charset="0"/>
+              <a:buChar char="•"/>
+              <a:defRPr sz="1400" kern="1200">
+                <a:solidFill>
+                  <a:schemeClr val="tx1"/>
+                </a:solidFill>
+                <a:latin typeface="+mn-lt"/>
+                <a:ea typeface="+mn-ea"/>
+                <a:cs typeface="+mn-cs"/>
+              </a:defRPr>
+            </a:lvl7pPr>
+            <a:lvl8pPr marL="3429000" indent="-228600" algn="l" defTabSz="914400" rtl="0" eaLnBrk="1" latinLnBrk="0" hangingPunct="1">
+              <a:lnSpc>
+                <a:spcPct val="90000"/>
+              </a:lnSpc>
+              <a:spcBef>
+                <a:spcPts val="500"/>
+              </a:spcBef>
+              <a:buFont typeface="Arial" panose="020B0604020202020204" pitchFamily="34" charset="0"/>
+              <a:buChar char="•"/>
+              <a:defRPr sz="1400" kern="1200">
+                <a:solidFill>
+                  <a:schemeClr val="tx1"/>
+                </a:solidFill>
+                <a:latin typeface="+mn-lt"/>
+                <a:ea typeface="+mn-ea"/>
+                <a:cs typeface="+mn-cs"/>
+              </a:defRPr>
+            </a:lvl8pPr>
+            <a:lvl9pPr marL="3886200" indent="-228600" algn="l" defTabSz="914400" rtl="0" eaLnBrk="1" latinLnBrk="0" hangingPunct="1">
+              <a:lnSpc>
+                <a:spcPct val="90000"/>
+              </a:lnSpc>
+              <a:spcBef>
+                <a:spcPts val="500"/>
+              </a:spcBef>
+              <a:buFont typeface="Arial" panose="020B0604020202020204" pitchFamily="34" charset="0"/>
+              <a:buChar char="•"/>
+              <a:defRPr sz="1400" kern="1200">
+                <a:solidFill>
+                  <a:schemeClr val="tx1"/>
+                </a:solidFill>
+                <a:latin typeface="+mn-lt"/>
+                <a:ea typeface="+mn-ea"/>
+                <a:cs typeface="+mn-cs"/>
+              </a:defRPr>
+            </a:lvl9pPr>
+          </a:lstStyle>
+          <a:p>
+            <a:r>
+              <a:rPr lang="pt-BR" dirty="0"/>
+              <a:t>DCL:</a:t>
+            </a:r>
+          </a:p>
+          <a:p>
+            <a:endParaRPr lang="pt-BR" dirty="0"/>
+          </a:p>
+          <a:p>
+            <a:endParaRPr lang="pt-BR" dirty="0"/>
+          </a:p>
+          <a:p>
+            <a:pPr marL="0" indent="0">
+              <a:buNone/>
+            </a:pPr>
+            <a:endParaRPr lang="pt-BR" dirty="0"/>
+          </a:p>
+          <a:p>
+            <a:r>
+              <a:rPr lang="pt-BR" dirty="0"/>
+              <a:t>Equações:</a:t>
+            </a:r>
+          </a:p>
+        </p:txBody>
+      </p:sp>
+      <p:pic>
+        <p:nvPicPr>
+          <p:cNvPr id="11" name="Imagem 10">
+            <a:extLst>
+              <a:ext uri="{FF2B5EF4-FFF2-40B4-BE49-F238E27FC236}">
+                <a16:creationId xmlns:a16="http://schemas.microsoft.com/office/drawing/2014/main" id="{8AEC2A14-EBF5-4669-A576-411E9C0957E0}"/>
+              </a:ext>
+            </a:extLst>
+          </p:cNvPr>
+          <p:cNvPicPr>
+            <a:picLocks noChangeAspect="1"/>
+          </p:cNvPicPr>
+          <p:nvPr/>
+        </p:nvPicPr>
+        <p:blipFill>
+          <a:blip r:embed="rId3"/>
+          <a:stretch>
+            <a:fillRect/>
+          </a:stretch>
+        </p:blipFill>
+        <p:spPr>
+          <a:xfrm>
+            <a:off x="6111594" y="2780442"/>
+            <a:ext cx="2854960" cy="1297116"/>
+          </a:xfrm>
+          <a:prstGeom prst="rect">
+            <a:avLst/>
+          </a:prstGeom>
+          <a:ln w="28575">
+            <a:solidFill>
+              <a:schemeClr val="bg1"/>
+            </a:solidFill>
+          </a:ln>
+        </p:spPr>
+      </p:pic>
+      <p:pic>
+        <p:nvPicPr>
+          <p:cNvPr id="12" name="Imagem 11">
+            <a:extLst>
+              <a:ext uri="{FF2B5EF4-FFF2-40B4-BE49-F238E27FC236}">
+                <a16:creationId xmlns:a16="http://schemas.microsoft.com/office/drawing/2014/main" id="{548D2099-CDEA-47BA-B47A-C2E68AAAA3D1}"/>
+              </a:ext>
+            </a:extLst>
+          </p:cNvPr>
+          <p:cNvPicPr>
+            <a:picLocks noChangeAspect="1"/>
+          </p:cNvPicPr>
+          <p:nvPr/>
+        </p:nvPicPr>
+        <p:blipFill>
+          <a:blip r:embed="rId4"/>
+          <a:stretch>
+            <a:fillRect/>
+          </a:stretch>
+        </p:blipFill>
+        <p:spPr>
+          <a:xfrm>
+            <a:off x="6049973" y="4683541"/>
+            <a:ext cx="3880515" cy="292082"/>
+          </a:xfrm>
+          <a:prstGeom prst="rect">
+            <a:avLst/>
+          </a:prstGeom>
+          <a:ln w="28575">
+            <a:solidFill>
+              <a:schemeClr val="bg1"/>
+            </a:solidFill>
+          </a:ln>
+        </p:spPr>
+      </p:pic>
+      <p:pic>
+        <p:nvPicPr>
+          <p:cNvPr id="13" name="Imagem 12">
+            <a:extLst>
+              <a:ext uri="{FF2B5EF4-FFF2-40B4-BE49-F238E27FC236}">
+                <a16:creationId xmlns:a16="http://schemas.microsoft.com/office/drawing/2014/main" id="{C40B650A-8068-48C6-813F-4B7893FD7B9F}"/>
+              </a:ext>
+            </a:extLst>
+          </p:cNvPr>
+          <p:cNvPicPr>
+            <a:picLocks noChangeAspect="1"/>
+          </p:cNvPicPr>
+          <p:nvPr/>
+        </p:nvPicPr>
+        <p:blipFill>
+          <a:blip r:embed="rId5"/>
+          <a:stretch>
+            <a:fillRect/>
+          </a:stretch>
+        </p:blipFill>
+        <p:spPr>
+          <a:xfrm>
+            <a:off x="6049973" y="5045764"/>
+            <a:ext cx="2661190" cy="292082"/>
+          </a:xfrm>
+          <a:prstGeom prst="rect">
+            <a:avLst/>
+          </a:prstGeom>
+          <a:ln w="28575">
+            <a:solidFill>
+              <a:schemeClr val="bg1"/>
+            </a:solidFill>
+          </a:ln>
+        </p:spPr>
+      </p:pic>
+      <p:pic>
+        <p:nvPicPr>
+          <p:cNvPr id="14" name="Imagem 13">
+            <a:extLst>
+              <a:ext uri="{FF2B5EF4-FFF2-40B4-BE49-F238E27FC236}">
+                <a16:creationId xmlns:a16="http://schemas.microsoft.com/office/drawing/2014/main" id="{E1638F61-92F0-440D-A027-4BBA4AA340AA}"/>
+              </a:ext>
+            </a:extLst>
+          </p:cNvPr>
+          <p:cNvPicPr>
+            <a:picLocks noChangeAspect="1"/>
+          </p:cNvPicPr>
+          <p:nvPr/>
+        </p:nvPicPr>
+        <p:blipFill>
+          <a:blip r:embed="rId6"/>
+          <a:stretch>
+            <a:fillRect/>
+          </a:stretch>
+        </p:blipFill>
+        <p:spPr>
+          <a:xfrm>
+            <a:off x="6049973" y="5404422"/>
+            <a:ext cx="4404168" cy="461626"/>
+          </a:xfrm>
+          <a:prstGeom prst="rect">
+            <a:avLst/>
+          </a:prstGeom>
+          <a:ln w="28575">
+            <a:solidFill>
+              <a:schemeClr val="bg1"/>
+            </a:solidFill>
+          </a:ln>
+        </p:spPr>
+      </p:pic>
+    </p:spTree>
+    <p:extLst>
+      <p:ext uri="{BB962C8B-B14F-4D97-AF65-F5344CB8AC3E}">
+        <p14:creationId xmlns:p14="http://schemas.microsoft.com/office/powerpoint/2010/main" val="965091218"/>
+      </p:ext>
+    </p:extLst>
+  </p:cSld>
+  <p:clrMapOvr>
+    <a:masterClrMapping/>
+  </p:clrMapOvr>
+</p:sld>
+</file>
+
+<file path=ppt/slides/slide7.xml><?xml version="1.0" encoding="utf-8"?>
+<p:sld xmlns:a="http://schemas.openxmlformats.org/drawingml/2006/main" xmlns:r="http://schemas.openxmlformats.org/officeDocument/2006/relationships" xmlns:p="http://schemas.openxmlformats.org/presentationml/2006/main">
+  <p:cSld>
+    <p:spTree>
+      <p:nvGrpSpPr>
+        <p:cNvPr id="1" name=""/>
+        <p:cNvGrpSpPr/>
+        <p:nvPr/>
+      </p:nvGrpSpPr>
+      <p:grpSpPr>
+        <a:xfrm>
+          <a:off x="0" y="0"/>
+          <a:ext cx="0" cy="0"/>
+          <a:chOff x="0" y="0"/>
+          <a:chExt cx="0" cy="0"/>
+        </a:xfrm>
+      </p:grpSpPr>
+      <p:sp>
+        <p:nvSpPr>
+          <p:cNvPr id="2" name="Título 1">
+            <a:extLst>
+              <a:ext uri="{FF2B5EF4-FFF2-40B4-BE49-F238E27FC236}">
+                <a16:creationId xmlns:a16="http://schemas.microsoft.com/office/drawing/2014/main" id="{80C50C88-63E1-467D-B210-3F2F07E52AE3}"/>
+              </a:ext>
+            </a:extLst>
+          </p:cNvPr>
+          <p:cNvSpPr>
+            <a:spLocks noGrp="1"/>
+          </p:cNvSpPr>
+          <p:nvPr>
+            <p:ph type="title"/>
+          </p:nvPr>
+        </p:nvSpPr>
+        <p:spPr/>
+        <p:txBody>
+          <a:bodyPr/>
+          <a:lstStyle/>
+          <a:p>
+            <a:r>
+              <a:rPr lang="pt-BR" dirty="0"/>
+              <a:t>Análise – massa pontual com ADV</a:t>
+            </a:r>
+          </a:p>
+        </p:txBody>
+      </p:sp>
+      <p:sp>
+        <p:nvSpPr>
+          <p:cNvPr id="3" name="Espaço Reservado para Conteúdo 2">
+            <a:extLst>
+              <a:ext uri="{FF2B5EF4-FFF2-40B4-BE49-F238E27FC236}">
+                <a16:creationId xmlns:a16="http://schemas.microsoft.com/office/drawing/2014/main" id="{7961D2B2-EAFC-4007-BFBB-596024A24869}"/>
+              </a:ext>
+            </a:extLst>
+          </p:cNvPr>
+          <p:cNvSpPr>
+            <a:spLocks noGrp="1"/>
+          </p:cNvSpPr>
+          <p:nvPr>
+            <p:ph idx="1"/>
+          </p:nvPr>
+        </p:nvSpPr>
+        <p:spPr/>
+        <p:txBody>
+          <a:bodyPr/>
+          <a:lstStyle/>
+          <a:p>
+            <a:r>
+              <a:rPr lang="pt-BR" dirty="0"/>
+              <a:t>Método de integração numérica utilizado:</a:t>
+            </a:r>
+          </a:p>
+          <a:p>
+            <a:pPr lvl="1"/>
+            <a:r>
+              <a:rPr lang="pt-BR" dirty="0" err="1"/>
+              <a:t>Runge-Kutta</a:t>
+            </a:r>
+            <a:r>
+              <a:rPr lang="pt-BR" dirty="0"/>
+              <a:t> de 4ª ordem.</a:t>
+            </a:r>
+          </a:p>
+          <a:p>
+            <a:pPr lvl="2"/>
+            <a:r>
+              <a:rPr lang="pt-BR" dirty="0"/>
+              <a:t>Solução de sistema de </a:t>
+            </a:r>
+            <a:r>
+              <a:rPr lang="pt-BR" dirty="0" err="1"/>
+              <a:t>EDOs</a:t>
+            </a:r>
+            <a:r>
+              <a:rPr lang="pt-BR" dirty="0"/>
+              <a:t> com problema de valor inicial.</a:t>
+            </a:r>
+          </a:p>
+          <a:p>
+            <a:pPr lvl="2"/>
+            <a:endParaRPr lang="pt-BR" dirty="0"/>
+          </a:p>
+          <a:p>
+            <a:r>
+              <a:rPr lang="pt-BR" dirty="0"/>
+              <a:t>EXPLICAR QUE PRECISOU ADAPTAR O RUNGE-KUTTA PARA EDO DE SEGUNDA ORDEM.</a:t>
+            </a:r>
+          </a:p>
+          <a:p>
+            <a:endParaRPr lang="pt-BR" dirty="0"/>
+          </a:p>
+        </p:txBody>
+      </p:sp>
+    </p:spTree>
+    <p:extLst>
+      <p:ext uri="{BB962C8B-B14F-4D97-AF65-F5344CB8AC3E}">
+        <p14:creationId xmlns:p14="http://schemas.microsoft.com/office/powerpoint/2010/main" val="2454361913"/>
+      </p:ext>
+    </p:extLst>
+  </p:cSld>
+  <p:clrMapOvr>
+    <a:masterClrMapping/>
+  </p:clrMapOvr>
+</p:sld>
+</file>
+
+<file path=ppt/slides/slide8.xml><?xml version="1.0" encoding="utf-8"?>
+<p:sld xmlns:a="http://schemas.openxmlformats.org/drawingml/2006/main" xmlns:r="http://schemas.openxmlformats.org/officeDocument/2006/relationships" xmlns:p="http://schemas.openxmlformats.org/presentationml/2006/main">
+  <p:cSld>
+    <p:spTree>
+      <p:nvGrpSpPr>
+        <p:cNvPr id="1" name=""/>
+        <p:cNvGrpSpPr/>
+        <p:nvPr/>
+      </p:nvGrpSpPr>
+      <p:grpSpPr>
+        <a:xfrm>
+          <a:off x="0" y="0"/>
+          <a:ext cx="0" cy="0"/>
+          <a:chOff x="0" y="0"/>
+          <a:chExt cx="0" cy="0"/>
+        </a:xfrm>
+      </p:grpSpPr>
+      <p:sp>
+        <p:nvSpPr>
+          <p:cNvPr id="2" name="Título 1">
+            <a:extLst>
+              <a:ext uri="{FF2B5EF4-FFF2-40B4-BE49-F238E27FC236}">
                 <a16:creationId xmlns:a16="http://schemas.microsoft.com/office/drawing/2014/main" id="{C22C42C2-FF65-4704-909A-22DF67AD2282}"/>
               </a:ext>
             </a:extLst>
@@ -8879,7 +9730,7 @@
             <a:pPr lvl="2"/>
             <a:r>
               <a:rPr lang="pt-BR" dirty="0"/>
-              <a:t>Solução matricial para elementos finitos.</a:t>
+              <a:t>Solução matricial com elementos finitos.</a:t>
             </a:r>
           </a:p>
         </p:txBody>
@@ -8953,6 +9804,92 @@
     <p:extLst>
       <p:ext uri="{BB962C8B-B14F-4D97-AF65-F5344CB8AC3E}">
         <p14:creationId xmlns:p14="http://schemas.microsoft.com/office/powerpoint/2010/main" val="1289924305"/>
+      </p:ext>
+    </p:extLst>
+  </p:cSld>
+  <p:clrMapOvr>
+    <a:masterClrMapping/>
+  </p:clrMapOvr>
+</p:sld>
+</file>
+
+<file path=ppt/slides/slide9.xml><?xml version="1.0" encoding="utf-8"?>
+<p:sld xmlns:a="http://schemas.openxmlformats.org/drawingml/2006/main" xmlns:r="http://schemas.openxmlformats.org/officeDocument/2006/relationships" xmlns:p="http://schemas.openxmlformats.org/presentationml/2006/main">
+  <p:cSld>
+    <p:spTree>
+      <p:nvGrpSpPr>
+        <p:cNvPr id="1" name=""/>
+        <p:cNvGrpSpPr/>
+        <p:nvPr/>
+      </p:nvGrpSpPr>
+      <p:grpSpPr>
+        <a:xfrm>
+          <a:off x="0" y="0"/>
+          <a:ext cx="0" cy="0"/>
+          <a:chOff x="0" y="0"/>
+          <a:chExt cx="0" cy="0"/>
+        </a:xfrm>
+      </p:grpSpPr>
+      <p:sp>
+        <p:nvSpPr>
+          <p:cNvPr id="2" name="Título 1">
+            <a:extLst>
+              <a:ext uri="{FF2B5EF4-FFF2-40B4-BE49-F238E27FC236}">
+                <a16:creationId xmlns:a16="http://schemas.microsoft.com/office/drawing/2014/main" id="{9C100922-245A-49A6-AA38-96661A56F1DD}"/>
+              </a:ext>
+            </a:extLst>
+          </p:cNvPr>
+          <p:cNvSpPr>
+            <a:spLocks noGrp="1"/>
+          </p:cNvSpPr>
+          <p:nvPr>
+            <p:ph type="title"/>
+          </p:nvPr>
+        </p:nvSpPr>
+        <p:spPr/>
+        <p:txBody>
+          <a:bodyPr/>
+          <a:lstStyle/>
+          <a:p>
+            <a:r>
+              <a:rPr lang="pt-BR" dirty="0"/>
+              <a:t>Análise – viga simples</a:t>
+            </a:r>
+          </a:p>
+        </p:txBody>
+      </p:sp>
+      <p:sp>
+        <p:nvSpPr>
+          <p:cNvPr id="3" name="Espaço Reservado para Conteúdo 2">
+            <a:extLst>
+              <a:ext uri="{FF2B5EF4-FFF2-40B4-BE49-F238E27FC236}">
+                <a16:creationId xmlns:a16="http://schemas.microsoft.com/office/drawing/2014/main" id="{DB4B567F-9C7F-4EE6-AF50-0D3CB2E33F3E}"/>
+              </a:ext>
+            </a:extLst>
+          </p:cNvPr>
+          <p:cNvSpPr>
+            <a:spLocks noGrp="1"/>
+          </p:cNvSpPr>
+          <p:nvPr>
+            <p:ph idx="1"/>
+          </p:nvPr>
+        </p:nvSpPr>
+        <p:spPr/>
+        <p:txBody>
+          <a:bodyPr/>
+          <a:lstStyle/>
+          <a:p>
+            <a:r>
+              <a:rPr lang="pt-BR" dirty="0"/>
+              <a:t>RESULTADOS</a:t>
+            </a:r>
+          </a:p>
+        </p:txBody>
+      </p:sp>
+    </p:spTree>
+    <p:extLst>
+      <p:ext uri="{BB962C8B-B14F-4D97-AF65-F5344CB8AC3E}">
+        <p14:creationId xmlns:p14="http://schemas.microsoft.com/office/powerpoint/2010/main" val="1418020833"/>
       </p:ext>
     </p:extLst>
   </p:cSld>

</xml_diff>